<commit_message>
Fill out the data sourcing & cleansing part
</commit_message>
<xml_diff>
--- a/Project 01.pptx
+++ b/Project 01.pptx
@@ -3490,7 +3490,7 @@
           <a:p>
             <a:fld id="{8369C108-6DA3-45F2-AE7E-50E80854775B}" type="datetimeFigureOut">
               <a:rPr lang="en-US" smtClean="0"/>
-              <a:t>4/9/2022</a:t>
+              <a:t>4/9/22</a:t>
             </a:fld>
             <a:endParaRPr lang="en-US" dirty="0"/>
           </a:p>
@@ -3667,7 +3667,7 @@
           <a:p>
             <a:fld id="{476A73B2-5605-4CC4-ADC6-622651651079}" type="datetimeFigureOut">
               <a:rPr lang="en-US" smtClean="0"/>
-              <a:t>4/9/2022</a:t>
+              <a:t>4/9/22</a:t>
             </a:fld>
             <a:endParaRPr lang="en-US" dirty="0"/>
           </a:p>
@@ -4769,7 +4769,7 @@
           <a:p>
             <a:fld id="{9AB3A824-1A51-4B26-AD58-A6D8E14F6C04}" type="datetimeFigureOut">
               <a:rPr lang="en-US" smtClean="0"/>
-              <a:t>4/9/2022</a:t>
+              <a:t>4/9/22</a:t>
             </a:fld>
             <a:endParaRPr lang="en-US" dirty="0"/>
           </a:p>
@@ -4943,7 +4943,7 @@
           <a:p>
             <a:fld id="{D857E33E-8B18-4087-B112-809917729534}" type="datetimeFigureOut">
               <a:rPr lang="en-US" smtClean="0"/>
-              <a:t>4/9/2022</a:t>
+              <a:t>4/9/22</a:t>
             </a:fld>
             <a:endParaRPr lang="en-US" dirty="0"/>
           </a:p>
@@ -5127,7 +5127,7 @@
           <a:p>
             <a:fld id="{D3FFE419-2371-464F-8239-3959401C3561}" type="datetimeFigureOut">
               <a:rPr lang="en-US" smtClean="0"/>
-              <a:t>4/9/2022</a:t>
+              <a:t>4/9/22</a:t>
             </a:fld>
             <a:endParaRPr lang="en-US" dirty="0"/>
           </a:p>
@@ -5301,7 +5301,7 @@
           <a:p>
             <a:fld id="{97D162C4-EDD9-4389-A98B-B87ECEA2A816}" type="datetimeFigureOut">
               <a:rPr lang="en-US" smtClean="0"/>
-              <a:t>4/9/2022</a:t>
+              <a:t>4/9/22</a:t>
             </a:fld>
             <a:endParaRPr lang="en-US" dirty="0"/>
           </a:p>
@@ -5573,7 +5573,7 @@
           <a:p>
             <a:fld id="{3E5059C3-6A89-4494-99FF-5A4D6FFD50EB}" type="datetimeFigureOut">
               <a:rPr lang="en-US" smtClean="0"/>
-              <a:t>4/9/2022</a:t>
+              <a:t>4/9/22</a:t>
             </a:fld>
             <a:endParaRPr lang="en-US" dirty="0"/>
           </a:p>
@@ -5809,7 +5809,7 @@
           <a:p>
             <a:fld id="{CA954B2F-12DE-47F5-8894-472B206D2E1E}" type="datetimeFigureOut">
               <a:rPr lang="en-US" smtClean="0"/>
-              <a:t>4/9/2022</a:t>
+              <a:t>4/9/22</a:t>
             </a:fld>
             <a:endParaRPr lang="en-US" dirty="0"/>
           </a:p>
@@ -6172,7 +6172,7 @@
           <a:p>
             <a:fld id="{3CBC1C18-307B-4F68-A007-B5B542270E8D}" type="datetimeFigureOut">
               <a:rPr lang="en-US" smtClean="0"/>
-              <a:t>4/9/2022</a:t>
+              <a:t>4/9/22</a:t>
             </a:fld>
             <a:endParaRPr lang="en-US" dirty="0"/>
           </a:p>
@@ -6319,7 +6319,7 @@
           <a:p>
             <a:fld id="{1FAF3416-4057-4DAA-829D-4CA07428D088}" type="datetimeFigureOut">
               <a:rPr lang="en-US" smtClean="0"/>
-              <a:t>4/9/2022</a:t>
+              <a:t>4/9/22</a:t>
             </a:fld>
             <a:endParaRPr lang="en-US" dirty="0"/>
           </a:p>
@@ -6418,7 +6418,7 @@
           <a:p>
             <a:fld id="{921D9284-D300-4297-87F7-E791DCC15DB1}" type="datetimeFigureOut">
               <a:rPr lang="en-US" smtClean="0"/>
-              <a:t>4/9/2022</a:t>
+              <a:t>4/9/22</a:t>
             </a:fld>
             <a:endParaRPr lang="en-US" dirty="0"/>
           </a:p>
@@ -6779,7 +6779,7 @@
           <a:p>
             <a:fld id="{37D525BB-DA17-4BA0-B3C8-3AC3ABC827E6}" type="datetimeFigureOut">
               <a:rPr lang="en-US" smtClean="0"/>
-              <a:t>4/9/2022</a:t>
+              <a:t>4/9/22</a:t>
             </a:fld>
             <a:endParaRPr lang="en-US" dirty="0"/>
           </a:p>
@@ -7140,7 +7140,7 @@
           <a:p>
             <a:fld id="{B16C4C9A-3960-41CF-A4E9-2A8FB932454B}" type="datetimeFigureOut">
               <a:rPr lang="en-US" smtClean="0"/>
-              <a:t>4/9/2022</a:t>
+              <a:t>4/9/22</a:t>
             </a:fld>
             <a:endParaRPr lang="en-US" dirty="0"/>
           </a:p>
@@ -7386,7 +7386,7 @@
           <a:p>
             <a:fld id="{3CBC1C18-307B-4F68-A007-B5B542270E8D}" type="datetimeFigureOut">
               <a:rPr lang="en-US" smtClean="0"/>
-              <a:t>4/9/2022</a:t>
+              <a:t>4/9/22</a:t>
             </a:fld>
             <a:endParaRPr lang="en-US" dirty="0"/>
           </a:p>
@@ -9553,8 +9553,8 @@
         </p:nvSpPr>
         <p:spPr>
           <a:xfrm>
-            <a:off x="5297763" y="751344"/>
-            <a:ext cx="5419898" cy="5078313"/>
+            <a:off x="5297762" y="751344"/>
+            <a:ext cx="6310657" cy="5632311"/>
           </a:xfrm>
           <a:prstGeom prst="rect">
             <a:avLst/>
@@ -9590,7 +9590,24 @@
             </a:pPr>
             <a:r>
               <a:rPr lang="en-US" dirty="0"/>
-              <a:t>Compiling the top 10 companies in terms of market capitalization. At first tried an API but then manually compiled. Summary APIs?</a:t>
+              <a:t>Compiling the top 10 companies in terms of market capitalization. At first tried an API but then manually compiled. </a:t>
+            </a:r>
+          </a:p>
+          <a:p>
+            <a:pPr marL="285750" indent="-285750">
+              <a:buFont typeface="Arial" panose="020B0604020202020204" pitchFamily="34" charset="0"/>
+              <a:buChar char="•"/>
+            </a:pPr>
+            <a:endParaRPr lang="en-US" dirty="0"/>
+          </a:p>
+          <a:p>
+            <a:pPr marL="285750" indent="-285750">
+              <a:buFont typeface="Arial" panose="020B0604020202020204" pitchFamily="34" charset="0"/>
+              <a:buChar char="•"/>
+            </a:pPr>
+            <a:r>
+              <a:rPr lang="en-US" dirty="0"/>
+              <a:t>Had challenges with the dashboard in general where the rendering of the plots were inconsistent across computers (resource / panel constraint?).</a:t>
             </a:r>
           </a:p>
           <a:p>
@@ -9869,8 +9886,8 @@
         </p:nvSpPr>
         <p:spPr>
           <a:xfrm>
-            <a:off x="1058903" y="1200231"/>
-            <a:ext cx="5419898" cy="2308324"/>
+            <a:off x="245328" y="245328"/>
+            <a:ext cx="6969512" cy="5909310"/>
           </a:xfrm>
           <a:prstGeom prst="rect">
             <a:avLst/>
@@ -9889,7 +9906,20 @@
             </a:pPr>
             <a:r>
               <a:rPr lang="en-US" dirty="0"/>
-              <a:t>Bullets</a:t>
+              <a:t>Keep the data collection limited but still gain insight at a macro level. We did this my limiting the analysis of the companies to top 10 by market cap for the years 2006 – 2021. This way we would cover the past losers &amp; the recent winners as well.</a:t>
+            </a:r>
+          </a:p>
+          <a:p>
+            <a:endParaRPr lang="en-US" dirty="0"/>
+          </a:p>
+          <a:p>
+            <a:pPr marL="285750" indent="-285750">
+              <a:buFont typeface="Arial" panose="020B0604020202020204" pitchFamily="34" charset="0"/>
+              <a:buChar char="•"/>
+            </a:pPr>
+            <a:r>
+              <a:rPr lang="en-US" dirty="0"/>
+              <a:t>The union of this list of companies were done manually &amp; we also picked up the ETFs per sector for our analysis. The data was sourced for the time period between 2006 &amp; 2021.</a:t>
             </a:r>
           </a:p>
           <a:p>
@@ -9904,10 +9934,18 @@
               <a:buFont typeface="Arial" panose="020B0604020202020204" pitchFamily="34" charset="0"/>
               <a:buChar char="•"/>
             </a:pPr>
-            <a:endParaRPr lang="en-US" dirty="0"/>
-          </a:p>
-          <a:p>
-            <a:endParaRPr lang="en-US" dirty="0"/>
+            <a:r>
+              <a:rPr lang="en-US" dirty="0"/>
+              <a:t>We used </a:t>
+            </a:r>
+            <a:r>
+              <a:rPr lang="en-US" dirty="0" err="1"/>
+              <a:t>yfinance</a:t>
+            </a:r>
+            <a:r>
+              <a:rPr lang="en-US" dirty="0"/>
+              <a:t> to primarily source all this data. To avoid the lack of data of non-US equities we decided to stick only to the US based companies. </a:t>
+            </a:r>
           </a:p>
           <a:p>
             <a:pPr marL="285750" indent="-285750">
@@ -9917,15 +9955,60 @@
             <a:endParaRPr lang="en-US" dirty="0"/>
           </a:p>
           <a:p>
-            <a:pPr marL="742950" lvl="1" indent="-285750">
+            <a:pPr marL="285750" indent="-285750">
+              <a:buFont typeface="Arial" panose="020B0604020202020204" pitchFamily="34" charset="0"/>
+              <a:buChar char="•"/>
+            </a:pPr>
+            <a:r>
+              <a:rPr lang="en-US" dirty="0"/>
+              <a:t>Since this is a stale data, we wanted to avoid downloading this data repeatedly &amp; stored it in a csv which was then used for the subsequent analysis..</a:t>
+            </a:r>
+          </a:p>
+          <a:p>
+            <a:pPr marL="285750" indent="-285750">
               <a:buFont typeface="Arial" panose="020B0604020202020204" pitchFamily="34" charset="0"/>
               <a:buChar char="•"/>
             </a:pPr>
             <a:endParaRPr lang="en-US" dirty="0"/>
           </a:p>
           <a:p>
-            <a:pPr lvl="1"/>
-            <a:endParaRPr lang="en-US" dirty="0"/>
+            <a:pPr marL="285750" indent="-285750">
+              <a:buFont typeface="Arial" panose="020B0604020202020204" pitchFamily="34" charset="0"/>
+              <a:buChar char="•"/>
+            </a:pPr>
+            <a:r>
+              <a:rPr lang="en-US" dirty="0"/>
+              <a:t> This being a large time period, we had to deal with lack of data for recently </a:t>
+            </a:r>
+            <a:r>
+              <a:rPr lang="en-US" dirty="0" err="1"/>
+              <a:t>IPOd</a:t>
+            </a:r>
+            <a:r>
+              <a:rPr lang="en-US" dirty="0"/>
+              <a:t> companies. We used </a:t>
+            </a:r>
+            <a:r>
+              <a:rPr lang="en-US" i="1" dirty="0" err="1"/>
+              <a:t>fillna</a:t>
+            </a:r>
+            <a:r>
+              <a:rPr lang="en-US" i="1" dirty="0"/>
+              <a:t>(method='backfill’) </a:t>
+            </a:r>
+            <a:r>
+              <a:rPr lang="en-US" dirty="0"/>
+              <a:t>to make sure the </a:t>
+            </a:r>
+            <a:r>
+              <a:rPr lang="en-US" dirty="0" err="1"/>
+              <a:t>pct_change</a:t>
+            </a:r>
+            <a:r>
+              <a:rPr lang="en-US" dirty="0"/>
+              <a:t>() values are sane for the missing data.</a:t>
+            </a:r>
+            <a:endParaRPr lang="en-US" i="1" dirty="0"/>
           </a:p>
           <a:p>
             <a:r>
@@ -10928,21 +11011,21 @@
 </file>
 
 <file path=customXml/item1.xml><?xml version="1.0" encoding="utf-8"?>
+<?mso-contentType ?>
+<FormTemplates xmlns="http://schemas.microsoft.com/sharepoint/v3/contenttype/forms">
+  <Display>DocumentLibraryForm</Display>
+  <Edit>DocumentLibraryForm</Edit>
+  <New>DocumentLibraryForm</New>
+</FormTemplates>
+</file>
+
+<file path=customXml/item2.xml><?xml version="1.0" encoding="utf-8"?>
 <p:properties xmlns:p="http://schemas.microsoft.com/office/2006/metadata/properties" xmlns:xsi="http://www.w3.org/2001/XMLSchema-instance" xmlns:pc="http://schemas.microsoft.com/office/infopath/2007/PartnerControls">
   <documentManagement>
     <Status xmlns="71af3243-3dd4-4a8d-8c0d-dd76da1f02a5">Not started</Status>
     <MediaServiceKeyPoints xmlns="71af3243-3dd4-4a8d-8c0d-dd76da1f02a5" xsi:nil="true"/>
   </documentManagement>
 </p:properties>
-</file>
-
-<file path=customXml/item2.xml><?xml version="1.0" encoding="utf-8"?>
-<?mso-contentType ?>
-<FormTemplates xmlns="http://schemas.microsoft.com/sharepoint/v3/contenttype/forms">
-  <Display>DocumentLibraryForm</Display>
-  <Edit>DocumentLibraryForm</Edit>
-  <New>DocumentLibraryForm</New>
-</FormTemplates>
 </file>
 
 <file path=customXml/item3.xml><?xml version="1.0" encoding="utf-8"?>
@@ -11167,19 +11250,19 @@
 </file>
 
 <file path=customXml/itemProps1.xml><?xml version="1.0" encoding="utf-8"?>
+<ds:datastoreItem xmlns:ds="http://schemas.openxmlformats.org/officeDocument/2006/customXml" ds:itemID="{C28223DC-4748-4F7F-8D8D-E4EA5A6C1882}">
+  <ds:schemaRefs>
+    <ds:schemaRef ds:uri="http://schemas.microsoft.com/sharepoint/v3/contenttype/forms"/>
+  </ds:schemaRefs>
+</ds:datastoreItem>
+</file>
+
+<file path=customXml/itemProps2.xml><?xml version="1.0" encoding="utf-8"?>
 <ds:datastoreItem xmlns:ds="http://schemas.openxmlformats.org/officeDocument/2006/customXml" ds:itemID="{1F4D5ADA-BB6C-46F4-9A97-3A3D44A9A8A6}">
   <ds:schemaRefs>
     <ds:schemaRef ds:uri="http://schemas.microsoft.com/office/2006/metadata/properties"/>
     <ds:schemaRef ds:uri="http://schemas.microsoft.com/office/infopath/2007/PartnerControls"/>
     <ds:schemaRef ds:uri="71af3243-3dd4-4a8d-8c0d-dd76da1f02a5"/>
-  </ds:schemaRefs>
-</ds:datastoreItem>
-</file>
-
-<file path=customXml/itemProps2.xml><?xml version="1.0" encoding="utf-8"?>
-<ds:datastoreItem xmlns:ds="http://schemas.openxmlformats.org/officeDocument/2006/customXml" ds:itemID="{C28223DC-4748-4F7F-8D8D-E4EA5A6C1882}">
-  <ds:schemaRefs>
-    <ds:schemaRef ds:uri="http://schemas.microsoft.com/sharepoint/v3/contenttype/forms"/>
   </ds:schemaRefs>
 </ds:datastoreItem>
 </file>

</xml_diff>

<commit_message>
Project Enhancements - slide deck change
</commit_message>
<xml_diff>
--- a/Project 01.pptx
+++ b/Project 01.pptx
@@ -5,10 +5,10 @@
     <p:sldMasterId id="2147483828" r:id="rId4"/>
   </p:sldMasterIdLst>
   <p:notesMasterIdLst>
-    <p:notesMasterId r:id="rId13"/>
+    <p:notesMasterId r:id="rId14"/>
   </p:notesMasterIdLst>
   <p:handoutMasterIdLst>
-    <p:handoutMasterId r:id="rId14"/>
+    <p:handoutMasterId r:id="rId15"/>
   </p:handoutMasterIdLst>
   <p:sldIdLst>
     <p:sldId id="256" r:id="rId5"/>
@@ -18,7 +18,8 @@
     <p:sldId id="263" r:id="rId9"/>
     <p:sldId id="264" r:id="rId10"/>
     <p:sldId id="265" r:id="rId11"/>
-    <p:sldId id="260" r:id="rId12"/>
+    <p:sldId id="266" r:id="rId12"/>
+    <p:sldId id="260" r:id="rId13"/>
   </p:sldIdLst>
   <p:sldSz cx="12192000" cy="6858000"/>
   <p:notesSz cx="6858000" cy="9144000"/>
@@ -4596,6 +4597,90 @@
     </p:spTree>
     <p:extLst>
       <p:ext uri="{BB962C8B-B14F-4D97-AF65-F5344CB8AC3E}">
+        <p14:creationId xmlns:p14="http://schemas.microsoft.com/office/powerpoint/2010/main" val="2587098286"/>
+      </p:ext>
+    </p:extLst>
+  </p:cSld>
+  <p:clrMapOvr>
+    <a:masterClrMapping/>
+  </p:clrMapOvr>
+</p:notes>
+</file>
+
+<file path=ppt/notesSlides/notesSlide9.xml><?xml version="1.0" encoding="utf-8"?>
+<p:notes xmlns:a="http://schemas.openxmlformats.org/drawingml/2006/main" xmlns:r="http://schemas.openxmlformats.org/officeDocument/2006/relationships" xmlns:p="http://schemas.openxmlformats.org/presentationml/2006/main">
+  <p:cSld>
+    <p:spTree>
+      <p:nvGrpSpPr>
+        <p:cNvPr id="1" name=""/>
+        <p:cNvGrpSpPr/>
+        <p:nvPr/>
+      </p:nvGrpSpPr>
+      <p:grpSpPr>
+        <a:xfrm>
+          <a:off x="0" y="0"/>
+          <a:ext cx="0" cy="0"/>
+          <a:chOff x="0" y="0"/>
+          <a:chExt cx="0" cy="0"/>
+        </a:xfrm>
+      </p:grpSpPr>
+      <p:sp>
+        <p:nvSpPr>
+          <p:cNvPr id="2" name="Slide Image Placeholder 1"/>
+          <p:cNvSpPr>
+            <a:spLocks noGrp="1" noRot="1" noChangeAspect="1"/>
+          </p:cNvSpPr>
+          <p:nvPr>
+            <p:ph type="sldImg"/>
+          </p:nvPr>
+        </p:nvSpPr>
+        <p:spPr/>
+      </p:sp>
+      <p:sp>
+        <p:nvSpPr>
+          <p:cNvPr id="3" name="Notes Placeholder 2"/>
+          <p:cNvSpPr>
+            <a:spLocks noGrp="1"/>
+          </p:cNvSpPr>
+          <p:nvPr>
+            <p:ph type="body" idx="1"/>
+          </p:nvPr>
+        </p:nvSpPr>
+        <p:spPr/>
+        <p:txBody>
+          <a:bodyPr/>
+          <a:lstStyle/>
+          <a:p>
+            <a:endParaRPr lang="en-US" dirty="0"/>
+          </a:p>
+        </p:txBody>
+      </p:sp>
+      <p:sp>
+        <p:nvSpPr>
+          <p:cNvPr id="4" name="Slide Number Placeholder 3"/>
+          <p:cNvSpPr>
+            <a:spLocks noGrp="1"/>
+          </p:cNvSpPr>
+          <p:nvPr>
+            <p:ph type="sldNum" sz="quarter" idx="5"/>
+          </p:nvPr>
+        </p:nvSpPr>
+        <p:spPr/>
+        <p:txBody>
+          <a:bodyPr/>
+          <a:lstStyle/>
+          <a:p>
+            <a:fld id="{CFED664B-377C-4B68-AF4E-EBDA643118DF}" type="slidenum">
+              <a:rPr lang="en-US" smtClean="0"/>
+              <a:t>9</a:t>
+            </a:fld>
+            <a:endParaRPr lang="en-US" dirty="0"/>
+          </a:p>
+        </p:txBody>
+      </p:sp>
+    </p:spTree>
+    <p:extLst>
+      <p:ext uri="{BB962C8B-B14F-4D97-AF65-F5344CB8AC3E}">
         <p14:creationId xmlns:p14="http://schemas.microsoft.com/office/powerpoint/2010/main" val="3050018501"/>
       </p:ext>
     </p:extLst>
@@ -9524,17 +9609,25 @@
         </p:spPr>
         <p:txBody>
           <a:bodyPr vert="horz" wrap="square" lIns="182880" tIns="182880" rIns="182880" bIns="182880" rtlCol="0" anchor="ctr">
-            <a:normAutofit fontScale="90000"/>
+            <a:normAutofit/>
           </a:bodyPr>
           <a:lstStyle/>
           <a:p>
+            <a:r>
+              <a:rPr lang="en-US" dirty="0" err="1">
+                <a:solidFill>
+                  <a:srgbClr val="FFFFFF"/>
+                </a:solidFill>
+              </a:rPr>
+              <a:t>ProJECT</a:t>
+            </a:r>
             <a:r>
               <a:rPr lang="en-US" dirty="0">
                 <a:solidFill>
                   <a:srgbClr val="FFFFFF"/>
                 </a:solidFill>
               </a:rPr>
-              <a:t>Project improvements &amp; difficulties</a:t>
+              <a:t> difficulties</a:t>
             </a:r>
           </a:p>
         </p:txBody>
@@ -9554,7 +9647,7 @@
         <p:spPr>
           <a:xfrm>
             <a:off x="5297762" y="751344"/>
-            <a:ext cx="6310657" cy="5632311"/>
+            <a:ext cx="6310657" cy="4801314"/>
           </a:xfrm>
           <a:prstGeom prst="rect">
             <a:avLst/>
@@ -9618,14 +9711,7 @@
             <a:endParaRPr lang="en-US" dirty="0"/>
           </a:p>
           <a:p>
-            <a:pPr marL="285750" indent="-285750">
-              <a:buFont typeface="Arial" panose="020B0604020202020204" pitchFamily="34" charset="0"/>
-              <a:buChar char="•"/>
-            </a:pPr>
-            <a:r>
-              <a:rPr lang="en-US" dirty="0"/>
-              <a:t>If we had more time, it would have been nice to extend our analysis back to the 1970s since the recession that occurred at the end of that decade will be most like the next recession we will endure in respects to inflation.</a:t>
-            </a:r>
+            <a:endParaRPr lang="en-US" dirty="0"/>
           </a:p>
           <a:p>
             <a:endParaRPr lang="en-US" dirty="0"/>
@@ -10032,6 +10118,329 @@
 </file>
 
 <file path=ppt/slides/slide8.xml><?xml version="1.0" encoding="utf-8"?>
+<p:sld xmlns:a="http://schemas.openxmlformats.org/drawingml/2006/main" xmlns:r="http://schemas.openxmlformats.org/officeDocument/2006/relationships" xmlns:p="http://schemas.openxmlformats.org/presentationml/2006/main">
+  <p:cSld>
+    <p:bg>
+      <p:bgPr>
+        <a:solidFill>
+          <a:schemeClr val="bg1"/>
+        </a:solidFill>
+        <a:effectLst/>
+      </p:bgPr>
+    </p:bg>
+    <p:spTree>
+      <p:nvGrpSpPr>
+        <p:cNvPr id="1" name=""/>
+        <p:cNvGrpSpPr/>
+        <p:nvPr/>
+      </p:nvGrpSpPr>
+      <p:grpSpPr>
+        <a:xfrm>
+          <a:off x="0" y="0"/>
+          <a:ext cx="0" cy="0"/>
+          <a:chOff x="0" y="0"/>
+          <a:chExt cx="0" cy="0"/>
+        </a:xfrm>
+      </p:grpSpPr>
+      <p:sp useBgFill="1">
+        <p:nvSpPr>
+          <p:cNvPr id="18" name="Rectangle 17">
+            <a:extLst>
+              <a:ext uri="{FF2B5EF4-FFF2-40B4-BE49-F238E27FC236}">
+                <a16:creationId xmlns:a16="http://schemas.microsoft.com/office/drawing/2014/main" id="{0AF33C27-9C85-4B30-9AD7-879D48AFE4FF}"/>
+              </a:ext>
+              <a:ext uri="{C183D7F6-B498-43B3-948B-1728B52AA6E4}">
+                <adec:decorative xmlns:adec="http://schemas.microsoft.com/office/drawing/2017/decorative" val="1"/>
+              </a:ext>
+            </a:extLst>
+          </p:cNvPr>
+          <p:cNvSpPr>
+            <a:spLocks noGrp="1" noRot="1" noChangeAspect="1" noMove="1" noResize="1" noEditPoints="1" noAdjustHandles="1" noChangeArrowheads="1" noChangeShapeType="1" noTextEdit="1"/>
+          </p:cNvSpPr>
+          <p:nvPr>
+            <p:extLst>
+              <p:ext uri="{386F3935-93C4-4BCD-93E2-E3B085C9AB24}">
+                <p16:designElem xmlns:p16="http://schemas.microsoft.com/office/powerpoint/2015/main" val="1"/>
+              </p:ext>
+            </p:extLst>
+          </p:nvPr>
+        </p:nvSpPr>
+        <p:spPr>
+          <a:xfrm>
+            <a:off x="0" y="0"/>
+            <a:ext cx="12191999" cy="6858000"/>
+          </a:xfrm>
+          <a:prstGeom prst="rect">
+            <a:avLst/>
+          </a:prstGeom>
+          <a:ln>
+            <a:noFill/>
+          </a:ln>
+        </p:spPr>
+        <p:style>
+          <a:lnRef idx="2">
+            <a:schemeClr val="accent1">
+              <a:shade val="50000"/>
+            </a:schemeClr>
+          </a:lnRef>
+          <a:fillRef idx="1">
+            <a:schemeClr val="accent1"/>
+          </a:fillRef>
+          <a:effectRef idx="0">
+            <a:schemeClr val="accent1"/>
+          </a:effectRef>
+          <a:fontRef idx="minor">
+            <a:schemeClr val="lt1"/>
+          </a:fontRef>
+        </p:style>
+        <p:txBody>
+          <a:bodyPr rtlCol="0" anchor="ctr"/>
+          <a:lstStyle/>
+          <a:p>
+            <a:pPr algn="ctr"/>
+            <a:endParaRPr lang="en-US" dirty="0"/>
+          </a:p>
+        </p:txBody>
+      </p:sp>
+      <p:sp>
+        <p:nvSpPr>
+          <p:cNvPr id="20" name="Rectangle 19">
+            <a:extLst>
+              <a:ext uri="{FF2B5EF4-FFF2-40B4-BE49-F238E27FC236}">
+                <a16:creationId xmlns:a16="http://schemas.microsoft.com/office/drawing/2014/main" id="{6D5089DD-882D-4413-B8BF-4798BFD84A98}"/>
+              </a:ext>
+              <a:ext uri="{C183D7F6-B498-43B3-948B-1728B52AA6E4}">
+                <adec:decorative xmlns:adec="http://schemas.microsoft.com/office/drawing/2017/decorative" val="1"/>
+              </a:ext>
+            </a:extLst>
+          </p:cNvPr>
+          <p:cNvSpPr>
+            <a:spLocks noGrp="1" noRot="1" noChangeAspect="1" noMove="1" noResize="1" noEditPoints="1" noAdjustHandles="1" noChangeArrowheads="1" noChangeShapeType="1" noTextEdit="1"/>
+          </p:cNvSpPr>
+          <p:nvPr>
+            <p:extLst>
+              <p:ext uri="{386F3935-93C4-4BCD-93E2-E3B085C9AB24}">
+                <p16:designElem xmlns:p16="http://schemas.microsoft.com/office/powerpoint/2015/main" val="1"/>
+              </p:ext>
+            </p:extLst>
+          </p:nvPr>
+        </p:nvSpPr>
+        <p:spPr>
+          <a:xfrm>
+            <a:off x="7537704" y="0"/>
+            <a:ext cx="4654296" cy="6858000"/>
+          </a:xfrm>
+          <a:prstGeom prst="rect">
+            <a:avLst/>
+          </a:prstGeom>
+          <a:solidFill>
+            <a:schemeClr val="tx1">
+              <a:lumMod val="95000"/>
+              <a:lumOff val="5000"/>
+            </a:schemeClr>
+          </a:solidFill>
+          <a:ln>
+            <a:noFill/>
+          </a:ln>
+        </p:spPr>
+        <p:style>
+          <a:lnRef idx="2">
+            <a:schemeClr val="accent1">
+              <a:shade val="50000"/>
+            </a:schemeClr>
+          </a:lnRef>
+          <a:fillRef idx="1">
+            <a:schemeClr val="accent1"/>
+          </a:fillRef>
+          <a:effectRef idx="0">
+            <a:schemeClr val="accent1"/>
+          </a:effectRef>
+          <a:fontRef idx="minor">
+            <a:schemeClr val="lt1"/>
+          </a:fontRef>
+        </p:style>
+        <p:txBody>
+          <a:bodyPr rtlCol="0" anchor="ctr"/>
+          <a:lstStyle/>
+          <a:p>
+            <a:pPr algn="ctr"/>
+            <a:endParaRPr lang="en-US" dirty="0"/>
+          </a:p>
+        </p:txBody>
+      </p:sp>
+      <p:sp>
+        <p:nvSpPr>
+          <p:cNvPr id="2" name="Title 1">
+            <a:extLst>
+              <a:ext uri="{FF2B5EF4-FFF2-40B4-BE49-F238E27FC236}">
+                <a16:creationId xmlns:a16="http://schemas.microsoft.com/office/drawing/2014/main" id="{8EB78894-19E5-4916-B37E-B4A80B9B8D52}"/>
+              </a:ext>
+            </a:extLst>
+          </p:cNvPr>
+          <p:cNvSpPr>
+            <a:spLocks noGrp="1"/>
+          </p:cNvSpPr>
+          <p:nvPr>
+            <p:ph type="title"/>
+          </p:nvPr>
+        </p:nvSpPr>
+        <p:spPr>
+          <a:xfrm>
+            <a:off x="8181171" y="2681103"/>
+            <a:ext cx="3363974" cy="1495794"/>
+          </a:xfrm>
+          <a:noFill/>
+          <a:ln>
+            <a:solidFill>
+              <a:srgbClr val="FFFFFF"/>
+            </a:solidFill>
+          </a:ln>
+          <a:effectLst>
+            <a:glow rad="152400">
+              <a:schemeClr val="bg1">
+                <a:alpha val="13000"/>
+              </a:schemeClr>
+            </a:glow>
+          </a:effectLst>
+        </p:spPr>
+        <p:txBody>
+          <a:bodyPr wrap="square">
+            <a:normAutofit fontScale="90000"/>
+          </a:bodyPr>
+          <a:lstStyle/>
+          <a:p>
+            <a:r>
+              <a:rPr lang="en-US" dirty="0">
+                <a:solidFill>
+                  <a:srgbClr val="FFFFFF"/>
+                </a:solidFill>
+              </a:rPr>
+              <a:t>Project Enhancements</a:t>
+            </a:r>
+          </a:p>
+        </p:txBody>
+      </p:sp>
+      <p:sp>
+        <p:nvSpPr>
+          <p:cNvPr id="5" name="TextBox 4">
+            <a:extLst>
+              <a:ext uri="{FF2B5EF4-FFF2-40B4-BE49-F238E27FC236}">
+                <a16:creationId xmlns:a16="http://schemas.microsoft.com/office/drawing/2014/main" id="{243BE7E8-47F4-41DF-BCC5-26C9526BBB0F}"/>
+              </a:ext>
+            </a:extLst>
+          </p:cNvPr>
+          <p:cNvSpPr txBox="1"/>
+          <p:nvPr/>
+        </p:nvSpPr>
+        <p:spPr>
+          <a:xfrm>
+            <a:off x="245328" y="245328"/>
+            <a:ext cx="6969512" cy="4247317"/>
+          </a:xfrm>
+          <a:prstGeom prst="rect">
+            <a:avLst/>
+          </a:prstGeom>
+          <a:noFill/>
+        </p:spPr>
+        <p:txBody>
+          <a:bodyPr wrap="square" rtlCol="0">
+            <a:spAutoFit/>
+          </a:bodyPr>
+          <a:lstStyle/>
+          <a:p>
+            <a:pPr marL="285750" indent="-285750">
+              <a:buFont typeface="Arial" panose="020B0604020202020204" pitchFamily="34" charset="0"/>
+              <a:buChar char="•"/>
+            </a:pPr>
+            <a:r>
+              <a:rPr lang="en-US" dirty="0"/>
+              <a:t>If we had more time, it would have been nice to extend our analysis back to the 1970s since the recession that occurred at the end of that decade will be most like the next recession we will endure in respects to inflation. </a:t>
+            </a:r>
+          </a:p>
+          <a:p>
+            <a:pPr marL="285750" indent="-285750">
+              <a:buFont typeface="Arial" panose="020B0604020202020204" pitchFamily="34" charset="0"/>
+              <a:buChar char="•"/>
+            </a:pPr>
+            <a:endParaRPr lang="en-US" dirty="0"/>
+          </a:p>
+          <a:p>
+            <a:pPr marL="285750" indent="-285750">
+              <a:buFont typeface="Arial" panose="020B0604020202020204" pitchFamily="34" charset="0"/>
+              <a:buChar char="•"/>
+            </a:pPr>
+            <a:r>
+              <a:rPr lang="en-US" dirty="0"/>
+              <a:t>Dynamic Event-based filters to help the user analyze the stocks during macro events (like 08 Recession, Presidential Elections, Brexit &amp; COVID).  </a:t>
+            </a:r>
+          </a:p>
+          <a:p>
+            <a:pPr marL="285750" indent="-285750">
+              <a:buFont typeface="Arial" panose="020B0604020202020204" pitchFamily="34" charset="0"/>
+              <a:buChar char="•"/>
+            </a:pPr>
+            <a:endParaRPr lang="en-US" dirty="0"/>
+          </a:p>
+          <a:p>
+            <a:pPr marL="285750" indent="-285750">
+              <a:buFont typeface="Arial" panose="020B0604020202020204" pitchFamily="34" charset="0"/>
+              <a:buChar char="•"/>
+            </a:pPr>
+            <a:r>
+              <a:rPr lang="en-US" dirty="0"/>
+              <a:t>Sentiment Analysis on stocks.</a:t>
+            </a:r>
+          </a:p>
+          <a:p>
+            <a:pPr marL="285750" indent="-285750">
+              <a:buFont typeface="Arial" panose="020B0604020202020204" pitchFamily="34" charset="0"/>
+              <a:buChar char="•"/>
+            </a:pPr>
+            <a:endParaRPr lang="en-US" dirty="0"/>
+          </a:p>
+          <a:p>
+            <a:pPr marL="285750" indent="-285750">
+              <a:buFont typeface="Arial" panose="020B0604020202020204" pitchFamily="34" charset="0"/>
+              <a:buChar char="•"/>
+            </a:pPr>
+            <a:r>
+              <a:rPr lang="en-US" dirty="0"/>
+              <a:t>Monte Carlo simulation for Portfolio Analysis.</a:t>
+            </a:r>
+          </a:p>
+          <a:p>
+            <a:pPr marL="285750" indent="-285750">
+              <a:buFont typeface="Arial" panose="020B0604020202020204" pitchFamily="34" charset="0"/>
+              <a:buChar char="•"/>
+            </a:pPr>
+            <a:endParaRPr lang="en-US" dirty="0"/>
+          </a:p>
+          <a:p>
+            <a:pPr marL="285750" indent="-285750">
+              <a:buFont typeface="Arial" panose="020B0604020202020204" pitchFamily="34" charset="0"/>
+              <a:buChar char="•"/>
+            </a:pPr>
+            <a:r>
+              <a:rPr lang="en-US" dirty="0"/>
+              <a:t>Apply Company Earnings and predict performs for top trending stocks.</a:t>
+            </a:r>
+          </a:p>
+        </p:txBody>
+      </p:sp>
+    </p:spTree>
+    <p:extLst>
+      <p:ext uri="{BB962C8B-B14F-4D97-AF65-F5344CB8AC3E}">
+        <p14:creationId xmlns:p14="http://schemas.microsoft.com/office/powerpoint/2010/main" val="274017520"/>
+      </p:ext>
+    </p:extLst>
+  </p:cSld>
+  <p:clrMapOvr>
+    <a:masterClrMapping/>
+  </p:clrMapOvr>
+</p:sld>
+</file>
+
+<file path=ppt/slides/slide9.xml><?xml version="1.0" encoding="utf-8"?>
 <p:sld xmlns:a="http://schemas.openxmlformats.org/drawingml/2006/main" xmlns:r="http://schemas.openxmlformats.org/officeDocument/2006/relationships" xmlns:p="http://schemas.openxmlformats.org/presentationml/2006/main">
   <p:cSld>
     <p:bg>
@@ -11011,15 +11420,6 @@
 </file>
 
 <file path=customXml/item1.xml><?xml version="1.0" encoding="utf-8"?>
-<?mso-contentType ?>
-<FormTemplates xmlns="http://schemas.microsoft.com/sharepoint/v3/contenttype/forms">
-  <Display>DocumentLibraryForm</Display>
-  <Edit>DocumentLibraryForm</Edit>
-  <New>DocumentLibraryForm</New>
-</FormTemplates>
-</file>
-
-<file path=customXml/item2.xml><?xml version="1.0" encoding="utf-8"?>
 <p:properties xmlns:p="http://schemas.microsoft.com/office/2006/metadata/properties" xmlns:xsi="http://www.w3.org/2001/XMLSchema-instance" xmlns:pc="http://schemas.microsoft.com/office/infopath/2007/PartnerControls">
   <documentManagement>
     <Status xmlns="71af3243-3dd4-4a8d-8c0d-dd76da1f02a5">Not started</Status>
@@ -11028,7 +11428,7 @@
 </p:properties>
 </file>
 
-<file path=customXml/item3.xml><?xml version="1.0" encoding="utf-8"?>
+<file path=customXml/item2.xml><?xml version="1.0" encoding="utf-8"?>
 <ct:contentTypeSchema xmlns:ct="http://schemas.microsoft.com/office/2006/metadata/contentType" xmlns:ma="http://schemas.microsoft.com/office/2006/metadata/properties/metaAttributes" ct:_="" ma:_="" ma:contentTypeName="Document" ma:contentTypeID="0x01010079F111ED35F8CC479449609E8A0923A6" ma:contentTypeVersion="12" ma:contentTypeDescription="Create a new document." ma:contentTypeScope="" ma:versionID="93813dd7ca6ad654711aa0ab317e03a3">
   <xsd:schema xmlns:xsd="http://www.w3.org/2001/XMLSchema" xmlns:xs="http://www.w3.org/2001/XMLSchema" xmlns:p="http://schemas.microsoft.com/office/2006/metadata/properties" xmlns:ns2="71af3243-3dd4-4a8d-8c0d-dd76da1f02a5" xmlns:ns3="16c05727-aa75-4e4a-9b5f-8a80a1165891" targetNamespace="http://schemas.microsoft.com/office/2006/metadata/properties" ma:root="true" ma:fieldsID="f11dc0ce689dd3925e84e4e35398c6e7" ns2:_="" ns3:_="">
     <xsd:import namespace="71af3243-3dd4-4a8d-8c0d-dd76da1f02a5"/>
@@ -11249,15 +11649,16 @@
 </ct:contentTypeSchema>
 </file>
 
-<file path=customXml/itemProps1.xml><?xml version="1.0" encoding="utf-8"?>
-<ds:datastoreItem xmlns:ds="http://schemas.openxmlformats.org/officeDocument/2006/customXml" ds:itemID="{C28223DC-4748-4F7F-8D8D-E4EA5A6C1882}">
-  <ds:schemaRefs>
-    <ds:schemaRef ds:uri="http://schemas.microsoft.com/sharepoint/v3/contenttype/forms"/>
-  </ds:schemaRefs>
-</ds:datastoreItem>
+<file path=customXml/item3.xml><?xml version="1.0" encoding="utf-8"?>
+<?mso-contentType ?>
+<FormTemplates xmlns="http://schemas.microsoft.com/sharepoint/v3/contenttype/forms">
+  <Display>DocumentLibraryForm</Display>
+  <Edit>DocumentLibraryForm</Edit>
+  <New>DocumentLibraryForm</New>
+</FormTemplates>
 </file>
 
-<file path=customXml/itemProps2.xml><?xml version="1.0" encoding="utf-8"?>
+<file path=customXml/itemProps1.xml><?xml version="1.0" encoding="utf-8"?>
 <ds:datastoreItem xmlns:ds="http://schemas.openxmlformats.org/officeDocument/2006/customXml" ds:itemID="{1F4D5ADA-BB6C-46F4-9A97-3A3D44A9A8A6}">
   <ds:schemaRefs>
     <ds:schemaRef ds:uri="http://schemas.microsoft.com/office/2006/metadata/properties"/>
@@ -11267,7 +11668,7 @@
 </ds:datastoreItem>
 </file>
 
-<file path=customXml/itemProps3.xml><?xml version="1.0" encoding="utf-8"?>
+<file path=customXml/itemProps2.xml><?xml version="1.0" encoding="utf-8"?>
 <ds:datastoreItem xmlns:ds="http://schemas.openxmlformats.org/officeDocument/2006/customXml" ds:itemID="{1612D154-BCA4-47A9-881C-4EFB9658D8AB}">
   <ds:schemaRefs>
     <ds:schemaRef ds:uri="http://schemas.microsoft.com/office/2006/metadata/contentType"/>
@@ -11284,4 +11685,12 @@
     <ds:schemaRef ds:uri="http://schemas.microsoft.com/internal/obd"/>
   </ds:schemaRefs>
 </ds:datastoreItem>
+</file>
+
+<file path=customXml/itemProps3.xml><?xml version="1.0" encoding="utf-8"?>
+<ds:datastoreItem xmlns:ds="http://schemas.openxmlformats.org/officeDocument/2006/customXml" ds:itemID="{C28223DC-4748-4F7F-8D8D-E4EA5A6C1882}">
+  <ds:schemaRefs>
+    <ds:schemaRef ds:uri="http://schemas.microsoft.com/sharepoint/v3/contenttype/forms"/>
+  </ds:schemaRefs>
+</ds:datastoreItem>
 </file>
</xml_diff>

<commit_message>
Fixed the market cap dashboard and updated market cap slide
</commit_message>
<xml_diff>
--- a/Project 01.pptx
+++ b/Project 01.pptx
@@ -3491,7 +3491,7 @@
           <a:p>
             <a:fld id="{8369C108-6DA3-45F2-AE7E-50E80854775B}" type="datetimeFigureOut">
               <a:rPr lang="en-US" smtClean="0"/>
-              <a:t>4/10/2022</a:t>
+              <a:t>4/11/22</a:t>
             </a:fld>
             <a:endParaRPr lang="en-US" dirty="0"/>
           </a:p>
@@ -3668,7 +3668,7 @@
           <a:p>
             <a:fld id="{476A73B2-5605-4CC4-ADC6-622651651079}" type="datetimeFigureOut">
               <a:rPr lang="en-US" smtClean="0"/>
-              <a:t>4/10/2022</a:t>
+              <a:t>4/11/22</a:t>
             </a:fld>
             <a:endParaRPr lang="en-US" dirty="0"/>
           </a:p>
@@ -4854,7 +4854,7 @@
           <a:p>
             <a:fld id="{9AB3A824-1A51-4B26-AD58-A6D8E14F6C04}" type="datetimeFigureOut">
               <a:rPr lang="en-US" smtClean="0"/>
-              <a:t>4/10/2022</a:t>
+              <a:t>4/11/22</a:t>
             </a:fld>
             <a:endParaRPr lang="en-US" dirty="0"/>
           </a:p>
@@ -5028,7 +5028,7 @@
           <a:p>
             <a:fld id="{D857E33E-8B18-4087-B112-809917729534}" type="datetimeFigureOut">
               <a:rPr lang="en-US" smtClean="0"/>
-              <a:t>4/10/2022</a:t>
+              <a:t>4/11/22</a:t>
             </a:fld>
             <a:endParaRPr lang="en-US" dirty="0"/>
           </a:p>
@@ -5212,7 +5212,7 @@
           <a:p>
             <a:fld id="{D3FFE419-2371-464F-8239-3959401C3561}" type="datetimeFigureOut">
               <a:rPr lang="en-US" smtClean="0"/>
-              <a:t>4/10/2022</a:t>
+              <a:t>4/11/22</a:t>
             </a:fld>
             <a:endParaRPr lang="en-US" dirty="0"/>
           </a:p>
@@ -5386,7 +5386,7 @@
           <a:p>
             <a:fld id="{97D162C4-EDD9-4389-A98B-B87ECEA2A816}" type="datetimeFigureOut">
               <a:rPr lang="en-US" smtClean="0"/>
-              <a:t>4/10/2022</a:t>
+              <a:t>4/11/22</a:t>
             </a:fld>
             <a:endParaRPr lang="en-US" dirty="0"/>
           </a:p>
@@ -5658,7 +5658,7 @@
           <a:p>
             <a:fld id="{3E5059C3-6A89-4494-99FF-5A4D6FFD50EB}" type="datetimeFigureOut">
               <a:rPr lang="en-US" smtClean="0"/>
-              <a:t>4/10/2022</a:t>
+              <a:t>4/11/22</a:t>
             </a:fld>
             <a:endParaRPr lang="en-US" dirty="0"/>
           </a:p>
@@ -5894,7 +5894,7 @@
           <a:p>
             <a:fld id="{CA954B2F-12DE-47F5-8894-472B206D2E1E}" type="datetimeFigureOut">
               <a:rPr lang="en-US" smtClean="0"/>
-              <a:t>4/10/2022</a:t>
+              <a:t>4/11/22</a:t>
             </a:fld>
             <a:endParaRPr lang="en-US" dirty="0"/>
           </a:p>
@@ -6257,7 +6257,7 @@
           <a:p>
             <a:fld id="{3CBC1C18-307B-4F68-A007-B5B542270E8D}" type="datetimeFigureOut">
               <a:rPr lang="en-US" smtClean="0"/>
-              <a:t>4/10/2022</a:t>
+              <a:t>4/11/22</a:t>
             </a:fld>
             <a:endParaRPr lang="en-US" dirty="0"/>
           </a:p>
@@ -6404,7 +6404,7 @@
           <a:p>
             <a:fld id="{1FAF3416-4057-4DAA-829D-4CA07428D088}" type="datetimeFigureOut">
               <a:rPr lang="en-US" smtClean="0"/>
-              <a:t>4/10/2022</a:t>
+              <a:t>4/11/22</a:t>
             </a:fld>
             <a:endParaRPr lang="en-US" dirty="0"/>
           </a:p>
@@ -6503,7 +6503,7 @@
           <a:p>
             <a:fld id="{921D9284-D300-4297-87F7-E791DCC15DB1}" type="datetimeFigureOut">
               <a:rPr lang="en-US" smtClean="0"/>
-              <a:t>4/10/2022</a:t>
+              <a:t>4/11/22</a:t>
             </a:fld>
             <a:endParaRPr lang="en-US" dirty="0"/>
           </a:p>
@@ -6864,7 +6864,7 @@
           <a:p>
             <a:fld id="{37D525BB-DA17-4BA0-B3C8-3AC3ABC827E6}" type="datetimeFigureOut">
               <a:rPr lang="en-US" smtClean="0"/>
-              <a:t>4/10/2022</a:t>
+              <a:t>4/11/22</a:t>
             </a:fld>
             <a:endParaRPr lang="en-US" dirty="0"/>
           </a:p>
@@ -7225,7 +7225,7 @@
           <a:p>
             <a:fld id="{B16C4C9A-3960-41CF-A4E9-2A8FB932454B}" type="datetimeFigureOut">
               <a:rPr lang="en-US" smtClean="0"/>
-              <a:t>4/10/2022</a:t>
+              <a:t>4/11/22</a:t>
             </a:fld>
             <a:endParaRPr lang="en-US" dirty="0"/>
           </a:p>
@@ -7471,7 +7471,7 @@
           <a:p>
             <a:fld id="{3CBC1C18-307B-4F68-A007-B5B542270E8D}" type="datetimeFigureOut">
               <a:rPr lang="en-US" smtClean="0"/>
-              <a:t>4/10/2022</a:t>
+              <a:t>4/11/22</a:t>
             </a:fld>
             <a:endParaRPr lang="en-US" dirty="0"/>
           </a:p>
@@ -8750,8 +8750,8 @@
         </p:nvSpPr>
         <p:spPr>
           <a:xfrm>
-            <a:off x="648393" y="1363287"/>
-            <a:ext cx="5447607" cy="369332"/>
+            <a:off x="648392" y="955783"/>
+            <a:ext cx="5447607" cy="5632311"/>
           </a:xfrm>
           <a:prstGeom prst="rect">
             <a:avLst/>
@@ -8764,10 +8764,151 @@
           </a:bodyPr>
           <a:lstStyle/>
           <a:p>
+            <a:pPr marL="285750" indent="-285750">
+              <a:buFont typeface="Arial" panose="020B0604020202020204" pitchFamily="34" charset="0"/>
+              <a:buChar char="•"/>
+            </a:pPr>
+            <a:endParaRPr lang="en-US" dirty="0"/>
+          </a:p>
+          <a:p>
+            <a:pPr marL="285750" indent="-285750">
+              <a:buFont typeface="Arial" panose="020B0604020202020204" pitchFamily="34" charset="0"/>
+              <a:buChar char="•"/>
+            </a:pPr>
             <a:r>
               <a:rPr lang="en-US" dirty="0"/>
-              <a:t>Patricia?</a:t>
-            </a:r>
+              <a:t>Tech sector on the raise from 2015 and dominating top 3 positions.</a:t>
+            </a:r>
+          </a:p>
+          <a:p>
+            <a:pPr marL="285750" indent="-285750">
+              <a:buFont typeface="Arial" panose="020B0604020202020204" pitchFamily="34" charset="0"/>
+              <a:buChar char="•"/>
+            </a:pPr>
+            <a:endParaRPr lang="en-US" dirty="0"/>
+          </a:p>
+          <a:p>
+            <a:pPr marL="285750" indent="-285750">
+              <a:buFont typeface="Arial" panose="020B0604020202020204" pitchFamily="34" charset="0"/>
+              <a:buChar char="•"/>
+            </a:pPr>
+            <a:r>
+              <a:rPr lang="en-US" dirty="0"/>
+              <a:t>Apple continues to stay at the top from 2010.</a:t>
+            </a:r>
+          </a:p>
+          <a:p>
+            <a:pPr marL="742950" lvl="1" indent="-285750">
+              <a:buFont typeface="Arial" panose="020B0604020202020204" pitchFamily="34" charset="0"/>
+              <a:buChar char="•"/>
+            </a:pPr>
+            <a:r>
+              <a:rPr lang="en-US" dirty="0"/>
+              <a:t>2009 - $189B to 2022 - $2.95T</a:t>
+            </a:r>
+          </a:p>
+          <a:p>
+            <a:pPr marL="285750" indent="-285750">
+              <a:buFont typeface="Arial" panose="020B0604020202020204" pitchFamily="34" charset="0"/>
+              <a:buChar char="•"/>
+            </a:pPr>
+            <a:endParaRPr lang="en-US" dirty="0"/>
+          </a:p>
+          <a:p>
+            <a:pPr marL="285750" indent="-285750">
+              <a:buFont typeface="Arial" panose="020B0604020202020204" pitchFamily="34" charset="0"/>
+              <a:buChar char="•"/>
+            </a:pPr>
+            <a:r>
+              <a:rPr lang="en-US" dirty="0"/>
+              <a:t>Amazon exceptional growth 2015 – $323B to 2022- $1.65T.</a:t>
+            </a:r>
+          </a:p>
+          <a:p>
+            <a:pPr marL="285750" indent="-285750">
+              <a:buFont typeface="Arial" panose="020B0604020202020204" pitchFamily="34" charset="0"/>
+              <a:buChar char="•"/>
+            </a:pPr>
+            <a:endParaRPr lang="en-US" dirty="0"/>
+          </a:p>
+          <a:p>
+            <a:pPr marL="285750" indent="-285750">
+              <a:buFont typeface="Arial" panose="020B0604020202020204" pitchFamily="34" charset="0"/>
+              <a:buChar char="•"/>
+            </a:pPr>
+            <a:r>
+              <a:rPr lang="en-US" dirty="0"/>
+              <a:t>Sustainable Energy awareness on the raise in comparison with Oil and Gas industries. </a:t>
+            </a:r>
+          </a:p>
+          <a:p>
+            <a:pPr marL="742950" lvl="1" indent="-285750">
+              <a:buFont typeface="Arial" panose="020B0604020202020204" pitchFamily="34" charset="0"/>
+              <a:buChar char="•"/>
+            </a:pPr>
+            <a:r>
+              <a:rPr lang="en-US" dirty="0"/>
+              <a:t>Tesla – Market Cap from 2020</a:t>
+            </a:r>
+          </a:p>
+          <a:p>
+            <a:pPr marL="742950" lvl="1" indent="-285750">
+              <a:buFont typeface="Arial" panose="020B0604020202020204" pitchFamily="34" charset="0"/>
+              <a:buChar char="•"/>
+            </a:pPr>
+            <a:r>
+              <a:rPr lang="en-US" dirty="0"/>
+              <a:t>Exxon Mobile 2006 -2016</a:t>
+            </a:r>
+          </a:p>
+          <a:p>
+            <a:pPr marL="285750" indent="-285750">
+              <a:buFont typeface="Arial" panose="020B0604020202020204" pitchFamily="34" charset="0"/>
+              <a:buChar char="•"/>
+            </a:pPr>
+            <a:endParaRPr lang="en-US" dirty="0"/>
+          </a:p>
+          <a:p>
+            <a:pPr marL="285750" indent="-285750">
+              <a:buFont typeface="Arial" panose="020B0604020202020204" pitchFamily="34" charset="0"/>
+              <a:buChar char="•"/>
+            </a:pPr>
+            <a:r>
+              <a:rPr lang="en-US" dirty="0"/>
+              <a:t>Subprime mortgage crisis and recession between 2007 to 2010.</a:t>
+            </a:r>
+          </a:p>
+          <a:p>
+            <a:pPr marL="742950" lvl="1" indent="-285750">
+              <a:buFont typeface="Arial" panose="020B0604020202020204" pitchFamily="34" charset="0"/>
+              <a:buChar char="•"/>
+            </a:pPr>
+            <a:r>
+              <a:rPr lang="en-US" dirty="0"/>
+              <a:t>Bank of America – </a:t>
+            </a:r>
+            <a:r>
+              <a:rPr lang="en-US"/>
+              <a:t>2006 </a:t>
+            </a:r>
+            <a:endParaRPr lang="en-US" dirty="0"/>
+          </a:p>
+          <a:p>
+            <a:pPr marL="742950" lvl="1" indent="-285750">
+              <a:buFont typeface="Arial" panose="020B0604020202020204" pitchFamily="34" charset="0"/>
+              <a:buChar char="•"/>
+            </a:pPr>
+            <a:r>
+              <a:rPr lang="en-US" dirty="0"/>
+              <a:t>Citi group</a:t>
+            </a:r>
+          </a:p>
+          <a:p>
+            <a:pPr marL="285750" indent="-285750">
+              <a:buFont typeface="Arial" panose="020B0604020202020204" pitchFamily="34" charset="0"/>
+              <a:buChar char="•"/>
+            </a:pPr>
+            <a:endParaRPr lang="en-US" dirty="0"/>
           </a:p>
         </p:txBody>
       </p:sp>
@@ -11565,6 +11706,24 @@
 </file>
 
 <file path=customXml/item1.xml><?xml version="1.0" encoding="utf-8"?>
+<p:properties xmlns:p="http://schemas.microsoft.com/office/2006/metadata/properties" xmlns:xsi="http://www.w3.org/2001/XMLSchema-instance" xmlns:pc="http://schemas.microsoft.com/office/infopath/2007/PartnerControls">
+  <documentManagement>
+    <Status xmlns="71af3243-3dd4-4a8d-8c0d-dd76da1f02a5">Not started</Status>
+    <MediaServiceKeyPoints xmlns="71af3243-3dd4-4a8d-8c0d-dd76da1f02a5" xsi:nil="true"/>
+  </documentManagement>
+</p:properties>
+</file>
+
+<file path=customXml/item2.xml><?xml version="1.0" encoding="utf-8"?>
+<?mso-contentType ?>
+<FormTemplates xmlns="http://schemas.microsoft.com/sharepoint/v3/contenttype/forms">
+  <Display>DocumentLibraryForm</Display>
+  <Edit>DocumentLibraryForm</Edit>
+  <New>DocumentLibraryForm</New>
+</FormTemplates>
+</file>
+
+<file path=customXml/item3.xml><?xml version="1.0" encoding="utf-8"?>
 <ct:contentTypeSchema xmlns:ct="http://schemas.microsoft.com/office/2006/metadata/contentType" xmlns:ma="http://schemas.microsoft.com/office/2006/metadata/properties/metaAttributes" ct:_="" ma:_="" ma:contentTypeName="Document" ma:contentTypeID="0x01010079F111ED35F8CC479449609E8A0923A6" ma:contentTypeVersion="12" ma:contentTypeDescription="Create a new document." ma:contentTypeScope="" ma:versionID="93813dd7ca6ad654711aa0ab317e03a3">
   <xsd:schema xmlns:xsd="http://www.w3.org/2001/XMLSchema" xmlns:xs="http://www.w3.org/2001/XMLSchema" xmlns:p="http://schemas.microsoft.com/office/2006/metadata/properties" xmlns:ns2="71af3243-3dd4-4a8d-8c0d-dd76da1f02a5" xmlns:ns3="16c05727-aa75-4e4a-9b5f-8a80a1165891" targetNamespace="http://schemas.microsoft.com/office/2006/metadata/properties" ma:root="true" ma:fieldsID="f11dc0ce689dd3925e84e4e35398c6e7" ns2:_="" ns3:_="">
     <xsd:import namespace="71af3243-3dd4-4a8d-8c0d-dd76da1f02a5"/>
@@ -11785,25 +11944,25 @@
 </ct:contentTypeSchema>
 </file>
 
-<file path=customXml/item2.xml><?xml version="1.0" encoding="utf-8"?>
-<?mso-contentType ?>
-<FormTemplates xmlns="http://schemas.microsoft.com/sharepoint/v3/contenttype/forms">
-  <Display>DocumentLibraryForm</Display>
-  <Edit>DocumentLibraryForm</Edit>
-  <New>DocumentLibraryForm</New>
-</FormTemplates>
+<file path=customXml/itemProps1.xml><?xml version="1.0" encoding="utf-8"?>
+<ds:datastoreItem xmlns:ds="http://schemas.openxmlformats.org/officeDocument/2006/customXml" ds:itemID="{1F4D5ADA-BB6C-46F4-9A97-3A3D44A9A8A6}">
+  <ds:schemaRefs>
+    <ds:schemaRef ds:uri="http://schemas.microsoft.com/office/2006/metadata/properties"/>
+    <ds:schemaRef ds:uri="http://schemas.microsoft.com/office/infopath/2007/PartnerControls"/>
+    <ds:schemaRef ds:uri="71af3243-3dd4-4a8d-8c0d-dd76da1f02a5"/>
+  </ds:schemaRefs>
+</ds:datastoreItem>
 </file>
 
-<file path=customXml/item3.xml><?xml version="1.0" encoding="utf-8"?>
-<p:properties xmlns:p="http://schemas.microsoft.com/office/2006/metadata/properties" xmlns:xsi="http://www.w3.org/2001/XMLSchema-instance" xmlns:pc="http://schemas.microsoft.com/office/infopath/2007/PartnerControls">
-  <documentManagement>
-    <Status xmlns="71af3243-3dd4-4a8d-8c0d-dd76da1f02a5">Not started</Status>
-    <MediaServiceKeyPoints xmlns="71af3243-3dd4-4a8d-8c0d-dd76da1f02a5" xsi:nil="true"/>
-  </documentManagement>
-</p:properties>
+<file path=customXml/itemProps2.xml><?xml version="1.0" encoding="utf-8"?>
+<ds:datastoreItem xmlns:ds="http://schemas.openxmlformats.org/officeDocument/2006/customXml" ds:itemID="{C28223DC-4748-4F7F-8D8D-E4EA5A6C1882}">
+  <ds:schemaRefs>
+    <ds:schemaRef ds:uri="http://schemas.microsoft.com/sharepoint/v3/contenttype/forms"/>
+  </ds:schemaRefs>
+</ds:datastoreItem>
 </file>
 
-<file path=customXml/itemProps1.xml><?xml version="1.0" encoding="utf-8"?>
+<file path=customXml/itemProps3.xml><?xml version="1.0" encoding="utf-8"?>
 <ds:datastoreItem xmlns:ds="http://schemas.openxmlformats.org/officeDocument/2006/customXml" ds:itemID="{1612D154-BCA4-47A9-881C-4EFB9658D8AB}">
   <ds:schemaRefs>
     <ds:schemaRef ds:uri="http://schemas.microsoft.com/office/2006/metadata/contentType"/>
@@ -11820,22 +11979,4 @@
     <ds:schemaRef ds:uri="http://schemas.microsoft.com/internal/obd"/>
   </ds:schemaRefs>
 </ds:datastoreItem>
-</file>
-
-<file path=customXml/itemProps2.xml><?xml version="1.0" encoding="utf-8"?>
-<ds:datastoreItem xmlns:ds="http://schemas.openxmlformats.org/officeDocument/2006/customXml" ds:itemID="{C28223DC-4748-4F7F-8D8D-E4EA5A6C1882}">
-  <ds:schemaRefs>
-    <ds:schemaRef ds:uri="http://schemas.microsoft.com/sharepoint/v3/contenttype/forms"/>
-  </ds:schemaRefs>
-</ds:datastoreItem>
-</file>
-
-<file path=customXml/itemProps3.xml><?xml version="1.0" encoding="utf-8"?>
-<ds:datastoreItem xmlns:ds="http://schemas.openxmlformats.org/officeDocument/2006/customXml" ds:itemID="{1F4D5ADA-BB6C-46F4-9A97-3A3D44A9A8A6}">
-  <ds:schemaRefs>
-    <ds:schemaRef ds:uri="http://schemas.microsoft.com/office/2006/metadata/properties"/>
-    <ds:schemaRef ds:uri="http://schemas.microsoft.com/office/infopath/2007/PartnerControls"/>
-    <ds:schemaRef ds:uri="71af3243-3dd4-4a8d-8c0d-dd76da1f02a5"/>
-  </ds:schemaRefs>
-</ds:datastoreItem>
 </file>
</xml_diff>

<commit_message>
updated ppt, pdf, README file
</commit_message>
<xml_diff>
--- a/Project 01.pptx
+++ b/Project 01.pptx
@@ -18,7 +18,7 @@
     <p:sldId id="263" r:id="rId9"/>
     <p:sldId id="264" r:id="rId10"/>
     <p:sldId id="265" r:id="rId11"/>
-    <p:sldId id="266" r:id="rId12"/>
+    <p:sldId id="267" r:id="rId12"/>
     <p:sldId id="260" r:id="rId13"/>
   </p:sldIdLst>
   <p:sldSz cx="12192000" cy="6858000"/>
@@ -3491,7 +3491,7 @@
           <a:p>
             <a:fld id="{8369C108-6DA3-45F2-AE7E-50E80854775B}" type="datetimeFigureOut">
               <a:rPr lang="en-US" smtClean="0"/>
-              <a:t>4/11/22</a:t>
+              <a:t>4/11/2022</a:t>
             </a:fld>
             <a:endParaRPr lang="en-US" dirty="0"/>
           </a:p>
@@ -3668,7 +3668,7 @@
           <a:p>
             <a:fld id="{476A73B2-5605-4CC4-ADC6-622651651079}" type="datetimeFigureOut">
               <a:rPr lang="en-US" smtClean="0"/>
-              <a:t>4/11/22</a:t>
+              <a:t>4/11/2022</a:t>
             </a:fld>
             <a:endParaRPr lang="en-US" dirty="0"/>
           </a:p>
@@ -4597,7 +4597,7 @@
     </p:spTree>
     <p:extLst>
       <p:ext uri="{BB962C8B-B14F-4D97-AF65-F5344CB8AC3E}">
-        <p14:creationId xmlns:p14="http://schemas.microsoft.com/office/powerpoint/2010/main" val="2587098286"/>
+        <p14:creationId xmlns:p14="http://schemas.microsoft.com/office/powerpoint/2010/main" val="2755063903"/>
       </p:ext>
     </p:extLst>
   </p:cSld>
@@ -4854,7 +4854,7 @@
           <a:p>
             <a:fld id="{9AB3A824-1A51-4B26-AD58-A6D8E14F6C04}" type="datetimeFigureOut">
               <a:rPr lang="en-US" smtClean="0"/>
-              <a:t>4/11/22</a:t>
+              <a:t>4/11/2022</a:t>
             </a:fld>
             <a:endParaRPr lang="en-US" dirty="0"/>
           </a:p>
@@ -5028,7 +5028,7 @@
           <a:p>
             <a:fld id="{D857E33E-8B18-4087-B112-809917729534}" type="datetimeFigureOut">
               <a:rPr lang="en-US" smtClean="0"/>
-              <a:t>4/11/22</a:t>
+              <a:t>4/11/2022</a:t>
             </a:fld>
             <a:endParaRPr lang="en-US" dirty="0"/>
           </a:p>
@@ -5212,7 +5212,7 @@
           <a:p>
             <a:fld id="{D3FFE419-2371-464F-8239-3959401C3561}" type="datetimeFigureOut">
               <a:rPr lang="en-US" smtClean="0"/>
-              <a:t>4/11/22</a:t>
+              <a:t>4/11/2022</a:t>
             </a:fld>
             <a:endParaRPr lang="en-US" dirty="0"/>
           </a:p>
@@ -5386,7 +5386,7 @@
           <a:p>
             <a:fld id="{97D162C4-EDD9-4389-A98B-B87ECEA2A816}" type="datetimeFigureOut">
               <a:rPr lang="en-US" smtClean="0"/>
-              <a:t>4/11/22</a:t>
+              <a:t>4/11/2022</a:t>
             </a:fld>
             <a:endParaRPr lang="en-US" dirty="0"/>
           </a:p>
@@ -5658,7 +5658,7 @@
           <a:p>
             <a:fld id="{3E5059C3-6A89-4494-99FF-5A4D6FFD50EB}" type="datetimeFigureOut">
               <a:rPr lang="en-US" smtClean="0"/>
-              <a:t>4/11/22</a:t>
+              <a:t>4/11/2022</a:t>
             </a:fld>
             <a:endParaRPr lang="en-US" dirty="0"/>
           </a:p>
@@ -5894,7 +5894,7 @@
           <a:p>
             <a:fld id="{CA954B2F-12DE-47F5-8894-472B206D2E1E}" type="datetimeFigureOut">
               <a:rPr lang="en-US" smtClean="0"/>
-              <a:t>4/11/22</a:t>
+              <a:t>4/11/2022</a:t>
             </a:fld>
             <a:endParaRPr lang="en-US" dirty="0"/>
           </a:p>
@@ -6257,7 +6257,7 @@
           <a:p>
             <a:fld id="{3CBC1C18-307B-4F68-A007-B5B542270E8D}" type="datetimeFigureOut">
               <a:rPr lang="en-US" smtClean="0"/>
-              <a:t>4/11/22</a:t>
+              <a:t>4/11/2022</a:t>
             </a:fld>
             <a:endParaRPr lang="en-US" dirty="0"/>
           </a:p>
@@ -6404,7 +6404,7 @@
           <a:p>
             <a:fld id="{1FAF3416-4057-4DAA-829D-4CA07428D088}" type="datetimeFigureOut">
               <a:rPr lang="en-US" smtClean="0"/>
-              <a:t>4/11/22</a:t>
+              <a:t>4/11/2022</a:t>
             </a:fld>
             <a:endParaRPr lang="en-US" dirty="0"/>
           </a:p>
@@ -6503,7 +6503,7 @@
           <a:p>
             <a:fld id="{921D9284-D300-4297-87F7-E791DCC15DB1}" type="datetimeFigureOut">
               <a:rPr lang="en-US" smtClean="0"/>
-              <a:t>4/11/22</a:t>
+              <a:t>4/11/2022</a:t>
             </a:fld>
             <a:endParaRPr lang="en-US" dirty="0"/>
           </a:p>
@@ -6864,7 +6864,7 @@
           <a:p>
             <a:fld id="{37D525BB-DA17-4BA0-B3C8-3AC3ABC827E6}" type="datetimeFigureOut">
               <a:rPr lang="en-US" smtClean="0"/>
-              <a:t>4/11/22</a:t>
+              <a:t>4/11/2022</a:t>
             </a:fld>
             <a:endParaRPr lang="en-US" dirty="0"/>
           </a:p>
@@ -7225,7 +7225,7 @@
           <a:p>
             <a:fld id="{B16C4C9A-3960-41CF-A4E9-2A8FB932454B}" type="datetimeFigureOut">
               <a:rPr lang="en-US" smtClean="0"/>
-              <a:t>4/11/22</a:t>
+              <a:t>4/11/2022</a:t>
             </a:fld>
             <a:endParaRPr lang="en-US" dirty="0"/>
           </a:p>
@@ -7471,7 +7471,7 @@
           <a:p>
             <a:fld id="{3CBC1C18-307B-4F68-A007-B5B542270E8D}" type="datetimeFigureOut">
               <a:rPr lang="en-US" smtClean="0"/>
-              <a:t>4/11/22</a:t>
+              <a:t>4/11/2022</a:t>
             </a:fld>
             <a:endParaRPr lang="en-US" dirty="0"/>
           </a:p>
@@ -8777,7 +8777,7 @@
             </a:pPr>
             <a:r>
               <a:rPr lang="en-US" dirty="0"/>
-              <a:t>Tech sector on the raise from 2015 and dominating top 3 positions.</a:t>
+              <a:t>Tech sector on the rise from 2015 and dominating top 3 positions.</a:t>
             </a:r>
           </a:p>
           <a:p>
@@ -8838,7 +8838,7 @@
             </a:pPr>
             <a:r>
               <a:rPr lang="en-US" dirty="0"/>
-              <a:t>Sustainable Energy awareness on the raise in comparison with Oil and Gas industries. </a:t>
+              <a:t>Sustainable Energy awareness on the rise in comparison with Oil and Gas industries. </a:t>
             </a:r>
           </a:p>
           <a:p>
@@ -8885,13 +8885,8 @@
             </a:pPr>
             <a:r>
               <a:rPr lang="en-US" dirty="0"/>
-              <a:t>Bank of America – </a:t>
-            </a:r>
-            <a:r>
-              <a:rPr lang="en-US"/>
-              <a:t>2006 </a:t>
-            </a:r>
-            <a:endParaRPr lang="en-US" dirty="0"/>
+              <a:t>Bank of America – 2006 </a:t>
+            </a:r>
           </a:p>
           <a:p>
             <a:pPr marL="742950" lvl="1" indent="-285750">
@@ -9900,20 +9895,12 @@
           <a:lstStyle/>
           <a:p>
             <a:r>
-              <a:rPr lang="en-US" dirty="0" err="1">
-                <a:solidFill>
-                  <a:srgbClr val="FFFFFF"/>
-                </a:solidFill>
-              </a:rPr>
-              <a:t>ProJECT</a:t>
-            </a:r>
-            <a:r>
               <a:rPr lang="en-US" dirty="0">
                 <a:solidFill>
                   <a:srgbClr val="FFFFFF"/>
                 </a:solidFill>
               </a:rPr>
-              <a:t> difficulties</a:t>
+              <a:t>Project difficulties</a:t>
             </a:r>
           </a:p>
         </p:txBody>
@@ -10433,7 +10420,7 @@
           <p:cNvPr id="18" name="Rectangle 17">
             <a:extLst>
               <a:ext uri="{FF2B5EF4-FFF2-40B4-BE49-F238E27FC236}">
-                <a16:creationId xmlns:a16="http://schemas.microsoft.com/office/drawing/2014/main" id="{0AF33C27-9C85-4B30-9AD7-879D48AFE4FF}"/>
+                <a16:creationId xmlns:a16="http://schemas.microsoft.com/office/drawing/2014/main" id="{93F0ADB5-A0B4-4B01-A8C4-FDC34CE22BD4}"/>
               </a:ext>
               <a:ext uri="{C183D7F6-B498-43B3-948B-1728B52AA6E4}">
                 <adec:decorative xmlns:adec="http://schemas.microsoft.com/office/drawing/2017/decorative" val="1"/>
@@ -10493,7 +10480,7 @@
           <p:cNvPr id="20" name="Rectangle 19">
             <a:extLst>
               <a:ext uri="{FF2B5EF4-FFF2-40B4-BE49-F238E27FC236}">
-                <a16:creationId xmlns:a16="http://schemas.microsoft.com/office/drawing/2014/main" id="{6D5089DD-882D-4413-B8BF-4798BFD84A98}"/>
+                <a16:creationId xmlns:a16="http://schemas.microsoft.com/office/drawing/2014/main" id="{AA6D0FDE-0241-4C21-A720-A69475358235}"/>
               </a:ext>
               <a:ext uri="{C183D7F6-B498-43B3-948B-1728B52AA6E4}">
                 <adec:decorative xmlns:adec="http://schemas.microsoft.com/office/drawing/2017/decorative" val="1"/>
@@ -10513,7 +10500,7 @@
         </p:nvSpPr>
         <p:spPr>
           <a:xfrm>
-            <a:off x="7537704" y="0"/>
+            <a:off x="0" y="0"/>
             <a:ext cx="4654296" cy="6858000"/>
           </a:xfrm>
           <a:prstGeom prst="rect">
@@ -10530,16 +10517,14 @@
           </a:ln>
         </p:spPr>
         <p:style>
-          <a:lnRef idx="2">
-            <a:schemeClr val="accent1">
-              <a:shade val="50000"/>
-            </a:schemeClr>
+          <a:lnRef idx="0">
+            <a:scrgbClr r="0" g="0" b="0"/>
           </a:lnRef>
-          <a:fillRef idx="1">
-            <a:schemeClr val="accent1"/>
+          <a:fillRef idx="0">
+            <a:scrgbClr r="0" g="0" b="0"/>
           </a:fillRef>
           <a:effectRef idx="0">
-            <a:schemeClr val="accent1"/>
+            <a:scrgbClr r="0" g="0" b="0"/>
           </a:effectRef>
           <a:fontRef idx="minor">
             <a:schemeClr val="lt1"/>
@@ -10559,7 +10544,7 @@
           <p:cNvPr id="2" name="Title 1">
             <a:extLst>
               <a:ext uri="{FF2B5EF4-FFF2-40B4-BE49-F238E27FC236}">
-                <a16:creationId xmlns:a16="http://schemas.microsoft.com/office/drawing/2014/main" id="{8EB78894-19E5-4916-B37E-B4A80B9B8D52}"/>
+                <a16:creationId xmlns:a16="http://schemas.microsoft.com/office/drawing/2014/main" id="{15115107-5DA3-4397-A1DA-67705DAE1EC2}"/>
               </a:ext>
             </a:extLst>
           </p:cNvPr>
@@ -10572,14 +10557,15 @@
         </p:nvSpPr>
         <p:spPr>
           <a:xfrm>
-            <a:off x="8181171" y="2681103"/>
+            <a:off x="643467" y="2681103"/>
             <a:ext cx="3363974" cy="1495794"/>
           </a:xfrm>
           <a:noFill/>
-          <a:ln>
+          <a:ln w="31750" cap="sq">
             <a:solidFill>
               <a:srgbClr val="FFFFFF"/>
             </a:solidFill>
+            <a:miter lim="800000"/>
           </a:ln>
           <a:effectLst>
             <a:glow rad="152400">
@@ -10590,7 +10576,7 @@
           </a:effectLst>
         </p:spPr>
         <p:txBody>
-          <a:bodyPr wrap="square">
+          <a:bodyPr vert="horz" wrap="square" lIns="182880" tIns="182880" rIns="182880" bIns="182880" rtlCol="0" anchor="ctr">
             <a:normAutofit fontScale="90000"/>
           </a:bodyPr>
           <a:lstStyle/>
@@ -10608,10 +10594,10 @@
       </p:sp>
       <p:sp>
         <p:nvSpPr>
-          <p:cNvPr id="5" name="TextBox 4">
+          <p:cNvPr id="6" name="TextBox 5">
             <a:extLst>
               <a:ext uri="{FF2B5EF4-FFF2-40B4-BE49-F238E27FC236}">
-                <a16:creationId xmlns:a16="http://schemas.microsoft.com/office/drawing/2014/main" id="{243BE7E8-47F4-41DF-BCC5-26C9526BBB0F}"/>
+                <a16:creationId xmlns:a16="http://schemas.microsoft.com/office/drawing/2014/main" id="{4AEC9FB3-EA1A-4574-87E8-E9A2E3C4B002}"/>
               </a:ext>
             </a:extLst>
           </p:cNvPr>
@@ -10620,7 +10606,7 @@
         </p:nvSpPr>
         <p:spPr>
           <a:xfrm>
-            <a:off x="245328" y="245328"/>
+            <a:off x="4938391" y="423607"/>
             <a:ext cx="6969512" cy="4247317"/>
           </a:xfrm>
           <a:prstGeom prst="rect">
@@ -10716,7 +10702,7 @@
     </p:spTree>
     <p:extLst>
       <p:ext uri="{BB962C8B-B14F-4D97-AF65-F5344CB8AC3E}">
-        <p14:creationId xmlns:p14="http://schemas.microsoft.com/office/powerpoint/2010/main" val="274017520"/>
+        <p14:creationId xmlns:p14="http://schemas.microsoft.com/office/powerpoint/2010/main" val="691527844"/>
       </p:ext>
     </p:extLst>
   </p:cSld>
@@ -11706,21 +11692,21 @@
 </file>
 
 <file path=customXml/item1.xml><?xml version="1.0" encoding="utf-8"?>
+<?mso-contentType ?>
+<FormTemplates xmlns="http://schemas.microsoft.com/sharepoint/v3/contenttype/forms">
+  <Display>DocumentLibraryForm</Display>
+  <Edit>DocumentLibraryForm</Edit>
+  <New>DocumentLibraryForm</New>
+</FormTemplates>
+</file>
+
+<file path=customXml/item2.xml><?xml version="1.0" encoding="utf-8"?>
 <p:properties xmlns:p="http://schemas.microsoft.com/office/2006/metadata/properties" xmlns:xsi="http://www.w3.org/2001/XMLSchema-instance" xmlns:pc="http://schemas.microsoft.com/office/infopath/2007/PartnerControls">
   <documentManagement>
     <Status xmlns="71af3243-3dd4-4a8d-8c0d-dd76da1f02a5">Not started</Status>
     <MediaServiceKeyPoints xmlns="71af3243-3dd4-4a8d-8c0d-dd76da1f02a5" xsi:nil="true"/>
   </documentManagement>
 </p:properties>
-</file>
-
-<file path=customXml/item2.xml><?xml version="1.0" encoding="utf-8"?>
-<?mso-contentType ?>
-<FormTemplates xmlns="http://schemas.microsoft.com/sharepoint/v3/contenttype/forms">
-  <Display>DocumentLibraryForm</Display>
-  <Edit>DocumentLibraryForm</Edit>
-  <New>DocumentLibraryForm</New>
-</FormTemplates>
 </file>
 
 <file path=customXml/item3.xml><?xml version="1.0" encoding="utf-8"?>
@@ -11945,19 +11931,19 @@
 </file>
 
 <file path=customXml/itemProps1.xml><?xml version="1.0" encoding="utf-8"?>
+<ds:datastoreItem xmlns:ds="http://schemas.openxmlformats.org/officeDocument/2006/customXml" ds:itemID="{C28223DC-4748-4F7F-8D8D-E4EA5A6C1882}">
+  <ds:schemaRefs>
+    <ds:schemaRef ds:uri="http://schemas.microsoft.com/sharepoint/v3/contenttype/forms"/>
+  </ds:schemaRefs>
+</ds:datastoreItem>
+</file>
+
+<file path=customXml/itemProps2.xml><?xml version="1.0" encoding="utf-8"?>
 <ds:datastoreItem xmlns:ds="http://schemas.openxmlformats.org/officeDocument/2006/customXml" ds:itemID="{1F4D5ADA-BB6C-46F4-9A97-3A3D44A9A8A6}">
   <ds:schemaRefs>
     <ds:schemaRef ds:uri="http://schemas.microsoft.com/office/2006/metadata/properties"/>
     <ds:schemaRef ds:uri="http://schemas.microsoft.com/office/infopath/2007/PartnerControls"/>
     <ds:schemaRef ds:uri="71af3243-3dd4-4a8d-8c0d-dd76da1f02a5"/>
-  </ds:schemaRefs>
-</ds:datastoreItem>
-</file>
-
-<file path=customXml/itemProps2.xml><?xml version="1.0" encoding="utf-8"?>
-<ds:datastoreItem xmlns:ds="http://schemas.openxmlformats.org/officeDocument/2006/customXml" ds:itemID="{C28223DC-4748-4F7F-8D8D-E4EA5A6C1882}">
-  <ds:schemaRefs>
-    <ds:schemaRef ds:uri="http://schemas.microsoft.com/sharepoint/v3/contenttype/forms"/>
   </ds:schemaRefs>
 </ds:datastoreItem>
 </file>

</xml_diff>